<commit_message>
mise à jour du makefile
</commit_message>
<xml_diff>
--- a/Soutenance.pptx
+++ b/Soutenance.pptx
@@ -5,7 +5,7 @@
     <p:sldMasterId id="2147483648" r:id="rId1"/>
   </p:sldMasterIdLst>
   <p:notesMasterIdLst>
-    <p:notesMasterId r:id="rId15"/>
+    <p:notesMasterId r:id="rId16"/>
   </p:notesMasterIdLst>
   <p:sldIdLst>
     <p:sldId id="268" r:id="rId2"/>
@@ -16,11 +16,12 @@
     <p:sldId id="259" r:id="rId7"/>
     <p:sldId id="260" r:id="rId8"/>
     <p:sldId id="261" r:id="rId9"/>
-    <p:sldId id="262" r:id="rId10"/>
-    <p:sldId id="263" r:id="rId11"/>
-    <p:sldId id="264" r:id="rId12"/>
-    <p:sldId id="265" r:id="rId13"/>
-    <p:sldId id="266" r:id="rId14"/>
+    <p:sldId id="263" r:id="rId10"/>
+    <p:sldId id="262" r:id="rId11"/>
+    <p:sldId id="270" r:id="rId12"/>
+    <p:sldId id="264" r:id="rId13"/>
+    <p:sldId id="265" r:id="rId14"/>
+    <p:sldId id="266" r:id="rId15"/>
   </p:sldIdLst>
   <p:sldSz cx="9144000" cy="6858000" type="screen4x3"/>
   <p:notesSz cx="6858000" cy="9144000"/>
@@ -822,7 +823,7 @@
             <a:fld id="{37DCBF2E-5754-4435-8474-711CD92E5B6C}" type="slidenum">
               <a:rPr lang="fr-FR" smtClean="0"/>
               <a:pPr/>
-              <a:t>9</a:t>
+              <a:t>10</a:t>
             </a:fld>
             <a:endParaRPr lang="fr-FR"/>
           </a:p>
@@ -912,7 +913,7 @@
             <a:fld id="{37DCBF2E-5754-4435-8474-711CD92E5B6C}" type="slidenum">
               <a:rPr lang="fr-FR" smtClean="0"/>
               <a:pPr/>
-              <a:t>12</a:t>
+              <a:t>13</a:t>
             </a:fld>
             <a:endParaRPr lang="fr-FR"/>
           </a:p>
@@ -3979,6 +3980,143 @@
       </p:grpSpPr>
       <p:pic>
         <p:nvPicPr>
+          <p:cNvPr id="4" name="Picture 6" descr="C:\Users\Senryoku\Desktop\Untitled-1.png"/>
+          <p:cNvPicPr>
+            <a:picLocks noChangeAspect="1" noChangeArrowheads="1"/>
+          </p:cNvPicPr>
+          <p:nvPr/>
+        </p:nvPicPr>
+        <p:blipFill>
+          <a:blip r:embed="rId3" cstate="print"/>
+          <a:srcRect/>
+          <a:stretch>
+            <a:fillRect/>
+          </a:stretch>
+        </p:blipFill>
+        <p:spPr bwMode="auto">
+          <a:xfrm>
+            <a:off x="0" y="0"/>
+            <a:ext cx="10039350" cy="1533525"/>
+          </a:xfrm>
+          <a:prstGeom prst="rect">
+            <a:avLst/>
+          </a:prstGeom>
+          <a:noFill/>
+        </p:spPr>
+      </p:pic>
+      <p:sp>
+        <p:nvSpPr>
+          <p:cNvPr id="2" name="Title 1"/>
+          <p:cNvSpPr>
+            <a:spLocks noGrp="1"/>
+          </p:cNvSpPr>
+          <p:nvPr>
+            <p:ph type="title"/>
+          </p:nvPr>
+        </p:nvSpPr>
+        <p:spPr/>
+        <p:txBody>
+          <a:bodyPr/>
+          <a:lstStyle/>
+          <a:p>
+            <a:r>
+              <a:rPr lang="fr-FR" dirty="0" smtClean="0"/>
+              <a:t>Module World</a:t>
+            </a:r>
+            <a:endParaRPr lang="fr-FR" dirty="0"/>
+          </a:p>
+        </p:txBody>
+      </p:sp>
+      <p:sp>
+        <p:nvSpPr>
+          <p:cNvPr id="3" name="Content Placeholder 2"/>
+          <p:cNvSpPr>
+            <a:spLocks noGrp="1"/>
+          </p:cNvSpPr>
+          <p:nvPr>
+            <p:ph idx="1"/>
+          </p:nvPr>
+        </p:nvSpPr>
+        <p:spPr/>
+        <p:txBody>
+          <a:bodyPr/>
+          <a:lstStyle/>
+          <a:p>
+            <a:pPr>
+              <a:buNone/>
+            </a:pPr>
+            <a:r>
+              <a:rPr lang="fr-FR" dirty="0" smtClean="0"/>
+              <a:t>Contient tout les objets physiques, permet l’itération et les opérations globales.</a:t>
+            </a:r>
+          </a:p>
+          <a:p>
+            <a:pPr>
+              <a:buNone/>
+            </a:pPr>
+            <a:r>
+              <a:rPr lang="fr-FR" dirty="0" smtClean="0"/>
+              <a:t>Impose des limites au </a:t>
+            </a:r>
+            <a:r>
+              <a:rPr lang="fr-FR" dirty="0" err="1" smtClean="0"/>
+              <a:t>Vertices</a:t>
+            </a:r>
+            <a:r>
+              <a:rPr lang="fr-FR" dirty="0" smtClean="0"/>
+              <a:t> (monde fini), gère les intervalles de temps utilisés par la simulation (Précédent et Courant).</a:t>
+            </a:r>
+          </a:p>
+          <a:p>
+            <a:pPr>
+              <a:buNone/>
+            </a:pPr>
+            <a:r>
+              <a:rPr lang="fr-FR" dirty="0" err="1" smtClean="0"/>
+              <a:t>Grid</a:t>
+            </a:r>
+            <a:r>
+              <a:rPr lang="fr-FR" dirty="0" smtClean="0"/>
+              <a:t> : Le monde est subdivisé pour éviter les opérations inutiles, ex : Tests de collision limité aux objets proches.</a:t>
+            </a:r>
+            <a:endParaRPr lang="fr-FR" dirty="0"/>
+          </a:p>
+        </p:txBody>
+      </p:sp>
+    </p:spTree>
+  </p:cSld>
+  <p:clrMapOvr>
+    <a:masterClrMapping/>
+  </p:clrMapOvr>
+  <p:timing>
+    <p:tnLst>
+      <p:par>
+        <p:cTn xmlns:p14="http://schemas.microsoft.com/office/powerpoint/2010/main" id="1" dur="indefinite" restart="never" nodeType="tmRoot"/>
+      </p:par>
+    </p:tnLst>
+  </p:timing>
+</p:sld>
+</file>
+
+<file path=ppt/slides/slide11.xml><?xml version="1.0" encoding="utf-8"?>
+<p:sld xmlns:a="http://schemas.openxmlformats.org/drawingml/2006/main" xmlns:r="http://schemas.openxmlformats.org/officeDocument/2006/relationships" xmlns:p="http://schemas.openxmlformats.org/presentationml/2006/main">
+  <p:cSld>
+    <p:spTree>
+      <p:nvGrpSpPr>
+        <p:cNvPr id="1" name=""/>
+        <p:cNvGrpSpPr/>
+        <p:nvPr/>
+      </p:nvGrpSpPr>
+      <p:grpSpPr>
+        <a:xfrm>
+          <a:off x="0" y="0"/>
+          <a:ext cx="0" cy="0"/>
+          <a:chOff x="0" y="0"/>
+          <a:chExt cx="0" cy="0"/>
+        </a:xfrm>
+      </p:grpSpPr>
+      <p:pic>
+        <p:nvPicPr>
           <p:cNvPr id="5" name="Picture 6" descr="C:\Users\Senryoku\Desktop\Untitled-1.png"/>
           <p:cNvPicPr>
             <a:picLocks noChangeAspect="1" noChangeArrowheads="1"/>
@@ -4087,6 +4225,11 @@
         </p:spPr>
       </p:pic>
     </p:spTree>
+    <p:extLst>
+      <p:ext uri="{BB962C8B-B14F-4D97-AF65-F5344CB8AC3E}">
+        <p14:creationId xmlns:p14="http://schemas.microsoft.com/office/powerpoint/2010/main" val="1968977345"/>
+      </p:ext>
+    </p:extLst>
   </p:cSld>
   <p:clrMapOvr>
     <a:masterClrMapping/>
@@ -4101,7 +4244,7 @@
 </p:sld>
 </file>
 
-<file path=ppt/slides/slide11.xml><?xml version="1.0" encoding="utf-8"?>
+<file path=ppt/slides/slide12.xml><?xml version="1.0" encoding="utf-8"?>
 <p:sld xmlns:a="http://schemas.openxmlformats.org/drawingml/2006/main" xmlns:r="http://schemas.openxmlformats.org/officeDocument/2006/relationships" xmlns:p="http://schemas.openxmlformats.org/presentationml/2006/main">
   <p:cSld>
     <p:spTree>
@@ -4277,7 +4420,7 @@
 </p:sld>
 </file>
 
-<file path=ppt/slides/slide12.xml><?xml version="1.0" encoding="utf-8"?>
+<file path=ppt/slides/slide13.xml><?xml version="1.0" encoding="utf-8"?>
 <p:sld xmlns:a="http://schemas.openxmlformats.org/drawingml/2006/main" xmlns:r="http://schemas.openxmlformats.org/officeDocument/2006/relationships" xmlns:p="http://schemas.openxmlformats.org/presentationml/2006/main">
   <p:cSld>
     <p:spTree>
@@ -4625,7 +4768,7 @@
 </p:sld>
 </file>
 
-<file path=ppt/slides/slide13.xml><?xml version="1.0" encoding="utf-8"?>
+<file path=ppt/slides/slide14.xml><?xml version="1.0" encoding="utf-8"?>
 <p:sld xmlns:a="http://schemas.openxmlformats.org/drawingml/2006/main" xmlns:r="http://schemas.openxmlformats.org/officeDocument/2006/relationships" xmlns:p="http://schemas.openxmlformats.org/presentationml/2006/main">
   <p:cSld>
     <p:spTree>
@@ -5590,11 +5733,11 @@
               <a:t>mulation</a:t>
             </a:r>
             <a:r>
-              <a:rPr lang="fr-FR" smtClean="0"/>
+              <a:rPr lang="fr-FR" dirty="0" smtClean="0"/>
               <a:t> </a:t>
             </a:r>
             <a:r>
-              <a:rPr lang="fr-FR" smtClean="0"/>
+              <a:rPr lang="fr-FR" dirty="0" smtClean="0"/>
               <a:t>simple </a:t>
             </a:r>
             <a:r>
@@ -10261,14 +10404,14 @@
       </p:grpSpPr>
       <p:pic>
         <p:nvPicPr>
-          <p:cNvPr id="4" name="Picture 6" descr="C:\Users\Senryoku\Desktop\Untitled-1.png"/>
+          <p:cNvPr id="5" name="Picture 6" descr="C:\Users\Senryoku\Desktop\Untitled-1.png"/>
           <p:cNvPicPr>
             <a:picLocks noChangeAspect="1" noChangeArrowheads="1"/>
           </p:cNvPicPr>
           <p:nvPr/>
         </p:nvPicPr>
         <p:blipFill>
-          <a:blip r:embed="rId3" cstate="print"/>
+          <a:blip r:embed="rId2" cstate="print"/>
           <a:srcRect/>
           <a:stretch>
             <a:fillRect/>
@@ -10301,66 +10444,135 @@
           <a:lstStyle/>
           <a:p>
             <a:r>
-              <a:rPr lang="fr-FR" dirty="0" smtClean="0"/>
-              <a:t>Module World</a:t>
-            </a:r>
-            <a:endParaRPr lang="fr-FR" dirty="0"/>
-          </a:p>
-        </p:txBody>
-      </p:sp>
-      <p:sp>
-        <p:nvSpPr>
-          <p:cNvPr id="3" name="Content Placeholder 2"/>
-          <p:cNvSpPr>
-            <a:spLocks noGrp="1"/>
-          </p:cNvSpPr>
-          <p:nvPr>
-            <p:ph idx="1"/>
-          </p:nvPr>
-        </p:nvSpPr>
-        <p:spPr/>
-        <p:txBody>
-          <a:bodyPr/>
-          <a:lstStyle/>
-          <a:p>
-            <a:pPr>
-              <a:buNone/>
-            </a:pPr>
-            <a:r>
-              <a:rPr lang="fr-FR" dirty="0" smtClean="0"/>
-              <a:t>Contient tout les objets physiques, permet l’itération et les opérations globales.</a:t>
-            </a:r>
-          </a:p>
-          <a:p>
-            <a:pPr>
-              <a:buNone/>
-            </a:pPr>
-            <a:r>
-              <a:rPr lang="fr-FR" dirty="0" smtClean="0"/>
-              <a:t>Impose des limites au </a:t>
-            </a:r>
-            <a:r>
-              <a:rPr lang="fr-FR" dirty="0" err="1" smtClean="0"/>
-              <a:t>Vertices</a:t>
-            </a:r>
-            <a:r>
-              <a:rPr lang="fr-FR" dirty="0" smtClean="0"/>
-              <a:t> (monde fini), gère les intervalles de temps utilisés par la simulation (Précédent et Courant).</a:t>
-            </a:r>
-          </a:p>
-          <a:p>
-            <a:pPr>
-              <a:buNone/>
-            </a:pPr>
-            <a:r>
               <a:rPr lang="fr-FR" dirty="0" err="1" smtClean="0"/>
               <a:t>Grid</a:t>
             </a:r>
-            <a:r>
-              <a:rPr lang="fr-FR" dirty="0" smtClean="0"/>
-              <a:t> : Le monde est subdivisé pour éviter les opérations inutiles, ex : Tests de collision limité aux objets proches.</a:t>
-            </a:r>
             <a:endParaRPr lang="fr-FR" dirty="0"/>
+          </a:p>
+        </p:txBody>
+      </p:sp>
+      <p:sp>
+        <p:nvSpPr>
+          <p:cNvPr id="6" name="CuadroTexto 5"/>
+          <p:cNvSpPr txBox="1"/>
+          <p:nvPr/>
+        </p:nvSpPr>
+        <p:spPr>
+          <a:xfrm>
+            <a:off x="323528" y="1700808"/>
+            <a:ext cx="8496944" cy="3046988"/>
+          </a:xfrm>
+          <a:prstGeom prst="rect">
+            <a:avLst/>
+          </a:prstGeom>
+          <a:noFill/>
+        </p:spPr>
+        <p:txBody>
+          <a:bodyPr wrap="square" rtlCol="0">
+            <a:spAutoFit/>
+          </a:bodyPr>
+          <a:lstStyle/>
+          <a:p>
+            <a:r>
+              <a:rPr lang="fr-FR" sz="2400" dirty="0" smtClean="0"/>
+              <a:t>-Insertion par </a:t>
+            </a:r>
+            <a:r>
+              <a:rPr lang="fr-FR" sz="2400" dirty="0" err="1" smtClean="0"/>
+              <a:t>Bounding</a:t>
+            </a:r>
+            <a:r>
+              <a:rPr lang="fr-FR" sz="2400" dirty="0" smtClean="0"/>
+              <a:t> Box</a:t>
+            </a:r>
+          </a:p>
+          <a:p>
+            <a:r>
+              <a:rPr lang="fr-FR" sz="2400" dirty="0" smtClean="0"/>
+              <a:t>-</a:t>
+            </a:r>
+            <a:r>
+              <a:rPr lang="fr-FR" sz="2400" dirty="0" smtClean="0"/>
+              <a:t>Suppression rapide grâce à la sauvegarde de la </a:t>
+            </a:r>
+            <a:r>
+              <a:rPr lang="fr-FR" sz="2400" dirty="0" err="1" smtClean="0"/>
+              <a:t>Bounding</a:t>
+            </a:r>
+            <a:r>
+              <a:rPr lang="fr-FR" sz="2400" dirty="0" smtClean="0"/>
+              <a:t> Box</a:t>
+            </a:r>
+          </a:p>
+          <a:p>
+            <a:r>
+              <a:rPr lang="fr-FR" sz="2400" dirty="0" smtClean="0"/>
+              <a:t>-Le moins de modification possibles</a:t>
+            </a:r>
+          </a:p>
+          <a:p>
+            <a:r>
+              <a:rPr lang="fr-FR" sz="2400" dirty="0" smtClean="0"/>
+              <a:t>-Accès aux listes de chaque cellule</a:t>
+            </a:r>
+          </a:p>
+          <a:p>
+            <a:r>
+              <a:rPr lang="fr-FR" sz="2400" dirty="0" smtClean="0"/>
+              <a:t>-Concaténation des liste de cellules où se trouve un polygone</a:t>
+            </a:r>
+          </a:p>
+          <a:p>
+            <a:endParaRPr lang="fr-FR" sz="2400" dirty="0"/>
+          </a:p>
+          <a:p>
+            <a:endParaRPr lang="fr-FR" sz="2400" dirty="0" smtClean="0"/>
+          </a:p>
+          <a:p>
+            <a:pPr algn="ctr"/>
+            <a:r>
+              <a:rPr lang="es-ES" sz="2400" dirty="0" smtClean="0">
+                <a:sym typeface="Wingdings"/>
+              </a:rPr>
+              <a:t> </a:t>
+            </a:r>
+            <a:r>
+              <a:rPr lang="es-ES" sz="2400" dirty="0" err="1" smtClean="0">
+                <a:sym typeface="Wingdings"/>
+              </a:rPr>
+              <a:t>Moins</a:t>
+            </a:r>
+            <a:r>
+              <a:rPr lang="es-ES" sz="2400" dirty="0" smtClean="0">
+                <a:sym typeface="Wingdings"/>
+              </a:rPr>
+              <a:t> de Test de </a:t>
+            </a:r>
+            <a:r>
+              <a:rPr lang="es-ES" sz="2400" dirty="0" err="1" smtClean="0">
+                <a:sym typeface="Wingdings"/>
+              </a:rPr>
+              <a:t>collisions</a:t>
+            </a:r>
+            <a:r>
+              <a:rPr lang="es-ES" sz="2400" dirty="0" smtClean="0">
+                <a:sym typeface="Wingdings"/>
+              </a:rPr>
+              <a:t> (Cher en </a:t>
+            </a:r>
+            <a:r>
+              <a:rPr lang="es-ES" sz="2400" dirty="0" err="1" smtClean="0">
+                <a:sym typeface="Wingdings"/>
+              </a:rPr>
+              <a:t>calculs</a:t>
+            </a:r>
+            <a:r>
+              <a:rPr lang="es-ES" sz="2400" smtClean="0">
+                <a:sym typeface="Wingdings"/>
+              </a:rPr>
+              <a:t>)</a:t>
+            </a:r>
+            <a:endParaRPr lang="fr-FR" sz="2400" dirty="0"/>
           </a:p>
         </p:txBody>
       </p:sp>

</xml_diff>